<commit_message>
pdf show de bola
</commit_message>
<xml_diff>
--- a/MONITORAMENTO/Documentação/PPTs/Cold Stock Apresentação - Sprint 3.pptx
+++ b/MONITORAMENTO/Documentação/PPTs/Cold Stock Apresentação - Sprint 3.pptx
@@ -262,7 +262,7 @@
           <a:p>
             <a:fld id="{47278C1A-96D6-4232-9F36-8FBD0594C554}" type="datetimeFigureOut">
               <a:rPr lang="pt-BR" smtClean="0"/>
-              <a:t>15/12/2020</a:t>
+              <a:t>16/12/2020</a:t>
             </a:fld>
             <a:endParaRPr lang="pt-BR"/>
           </a:p>
@@ -304,7 +304,7 @@
           <a:p>
             <a:fld id="{26DF22C3-F9EA-40C4-AB4C-A1C88679FAB8}" type="slidenum">
               <a:rPr lang="pt-BR" smtClean="0"/>
-              <a:t>‹nº›</a:t>
+              <a:t>‹#›</a:t>
             </a:fld>
             <a:endParaRPr lang="pt-BR"/>
           </a:p>
@@ -430,7 +430,7 @@
           <a:p>
             <a:fld id="{47278C1A-96D6-4232-9F36-8FBD0594C554}" type="datetimeFigureOut">
               <a:rPr lang="pt-BR" smtClean="0"/>
-              <a:t>15/12/2020</a:t>
+              <a:t>16/12/2020</a:t>
             </a:fld>
             <a:endParaRPr lang="pt-BR"/>
           </a:p>
@@ -472,7 +472,7 @@
           <a:p>
             <a:fld id="{26DF22C3-F9EA-40C4-AB4C-A1C88679FAB8}" type="slidenum">
               <a:rPr lang="pt-BR" smtClean="0"/>
-              <a:t>‹nº›</a:t>
+              <a:t>‹#›</a:t>
             </a:fld>
             <a:endParaRPr lang="pt-BR"/>
           </a:p>
@@ -608,7 +608,7 @@
           <a:p>
             <a:fld id="{47278C1A-96D6-4232-9F36-8FBD0594C554}" type="datetimeFigureOut">
               <a:rPr lang="pt-BR" smtClean="0"/>
-              <a:t>15/12/2020</a:t>
+              <a:t>16/12/2020</a:t>
             </a:fld>
             <a:endParaRPr lang="pt-BR"/>
           </a:p>
@@ -650,7 +650,7 @@
           <a:p>
             <a:fld id="{26DF22C3-F9EA-40C4-AB4C-A1C88679FAB8}" type="slidenum">
               <a:rPr lang="pt-BR" smtClean="0"/>
-              <a:t>‹nº›</a:t>
+              <a:t>‹#›</a:t>
             </a:fld>
             <a:endParaRPr lang="pt-BR"/>
           </a:p>
@@ -776,7 +776,7 @@
           <a:p>
             <a:fld id="{47278C1A-96D6-4232-9F36-8FBD0594C554}" type="datetimeFigureOut">
               <a:rPr lang="pt-BR" smtClean="0"/>
-              <a:t>15/12/2020</a:t>
+              <a:t>16/12/2020</a:t>
             </a:fld>
             <a:endParaRPr lang="pt-BR"/>
           </a:p>
@@ -818,7 +818,7 @@
           <a:p>
             <a:fld id="{26DF22C3-F9EA-40C4-AB4C-A1C88679FAB8}" type="slidenum">
               <a:rPr lang="pt-BR" smtClean="0"/>
-              <a:t>‹nº›</a:t>
+              <a:t>‹#›</a:t>
             </a:fld>
             <a:endParaRPr lang="pt-BR"/>
           </a:p>
@@ -1021,7 +1021,7 @@
           <a:p>
             <a:fld id="{47278C1A-96D6-4232-9F36-8FBD0594C554}" type="datetimeFigureOut">
               <a:rPr lang="pt-BR" smtClean="0"/>
-              <a:t>15/12/2020</a:t>
+              <a:t>16/12/2020</a:t>
             </a:fld>
             <a:endParaRPr lang="pt-BR"/>
           </a:p>
@@ -1063,7 +1063,7 @@
           <a:p>
             <a:fld id="{26DF22C3-F9EA-40C4-AB4C-A1C88679FAB8}" type="slidenum">
               <a:rPr lang="pt-BR" smtClean="0"/>
-              <a:t>‹nº›</a:t>
+              <a:t>‹#›</a:t>
             </a:fld>
             <a:endParaRPr lang="pt-BR"/>
           </a:p>
@@ -1250,7 +1250,7 @@
           <a:p>
             <a:fld id="{47278C1A-96D6-4232-9F36-8FBD0594C554}" type="datetimeFigureOut">
               <a:rPr lang="pt-BR" smtClean="0"/>
-              <a:t>15/12/2020</a:t>
+              <a:t>16/12/2020</a:t>
             </a:fld>
             <a:endParaRPr lang="pt-BR"/>
           </a:p>
@@ -1292,7 +1292,7 @@
           <a:p>
             <a:fld id="{26DF22C3-F9EA-40C4-AB4C-A1C88679FAB8}" type="slidenum">
               <a:rPr lang="pt-BR" smtClean="0"/>
-              <a:t>‹nº›</a:t>
+              <a:t>‹#›</a:t>
             </a:fld>
             <a:endParaRPr lang="pt-BR"/>
           </a:p>
@@ -1614,7 +1614,7 @@
           <a:p>
             <a:fld id="{47278C1A-96D6-4232-9F36-8FBD0594C554}" type="datetimeFigureOut">
               <a:rPr lang="pt-BR" smtClean="0"/>
-              <a:t>15/12/2020</a:t>
+              <a:t>16/12/2020</a:t>
             </a:fld>
             <a:endParaRPr lang="pt-BR"/>
           </a:p>
@@ -1656,7 +1656,7 @@
           <a:p>
             <a:fld id="{26DF22C3-F9EA-40C4-AB4C-A1C88679FAB8}" type="slidenum">
               <a:rPr lang="pt-BR" smtClean="0"/>
-              <a:t>‹nº›</a:t>
+              <a:t>‹#›</a:t>
             </a:fld>
             <a:endParaRPr lang="pt-BR"/>
           </a:p>
@@ -1731,7 +1731,7 @@
           <a:p>
             <a:fld id="{47278C1A-96D6-4232-9F36-8FBD0594C554}" type="datetimeFigureOut">
               <a:rPr lang="pt-BR" smtClean="0"/>
-              <a:t>15/12/2020</a:t>
+              <a:t>16/12/2020</a:t>
             </a:fld>
             <a:endParaRPr lang="pt-BR"/>
           </a:p>
@@ -1773,7 +1773,7 @@
           <a:p>
             <a:fld id="{26DF22C3-F9EA-40C4-AB4C-A1C88679FAB8}" type="slidenum">
               <a:rPr lang="pt-BR" smtClean="0"/>
-              <a:t>‹nº›</a:t>
+              <a:t>‹#›</a:t>
             </a:fld>
             <a:endParaRPr lang="pt-BR"/>
           </a:p>
@@ -1826,7 +1826,7 @@
           <a:p>
             <a:fld id="{47278C1A-96D6-4232-9F36-8FBD0594C554}" type="datetimeFigureOut">
               <a:rPr lang="pt-BR" smtClean="0"/>
-              <a:t>15/12/2020</a:t>
+              <a:t>16/12/2020</a:t>
             </a:fld>
             <a:endParaRPr lang="pt-BR"/>
           </a:p>
@@ -1868,7 +1868,7 @@
           <a:p>
             <a:fld id="{26DF22C3-F9EA-40C4-AB4C-A1C88679FAB8}" type="slidenum">
               <a:rPr lang="pt-BR" smtClean="0"/>
-              <a:t>‹nº›</a:t>
+              <a:t>‹#›</a:t>
             </a:fld>
             <a:endParaRPr lang="pt-BR"/>
           </a:p>
@@ -2101,7 +2101,7 @@
           <a:p>
             <a:fld id="{47278C1A-96D6-4232-9F36-8FBD0594C554}" type="datetimeFigureOut">
               <a:rPr lang="pt-BR" smtClean="0"/>
-              <a:t>15/12/2020</a:t>
+              <a:t>16/12/2020</a:t>
             </a:fld>
             <a:endParaRPr lang="pt-BR"/>
           </a:p>
@@ -2143,7 +2143,7 @@
           <a:p>
             <a:fld id="{26DF22C3-F9EA-40C4-AB4C-A1C88679FAB8}" type="slidenum">
               <a:rPr lang="pt-BR" smtClean="0"/>
-              <a:t>‹nº›</a:t>
+              <a:t>‹#›</a:t>
             </a:fld>
             <a:endParaRPr lang="pt-BR"/>
           </a:p>
@@ -2353,7 +2353,7 @@
           <a:p>
             <a:fld id="{47278C1A-96D6-4232-9F36-8FBD0594C554}" type="datetimeFigureOut">
               <a:rPr lang="pt-BR" smtClean="0"/>
-              <a:t>15/12/2020</a:t>
+              <a:t>16/12/2020</a:t>
             </a:fld>
             <a:endParaRPr lang="pt-BR"/>
           </a:p>
@@ -2395,7 +2395,7 @@
           <a:p>
             <a:fld id="{26DF22C3-F9EA-40C4-AB4C-A1C88679FAB8}" type="slidenum">
               <a:rPr lang="pt-BR" smtClean="0"/>
-              <a:t>‹nº›</a:t>
+              <a:t>‹#›</a:t>
             </a:fld>
             <a:endParaRPr lang="pt-BR"/>
           </a:p>
@@ -2564,7 +2564,7 @@
           <a:p>
             <a:fld id="{47278C1A-96D6-4232-9F36-8FBD0594C554}" type="datetimeFigureOut">
               <a:rPr lang="pt-BR" smtClean="0"/>
-              <a:t>15/12/2020</a:t>
+              <a:t>16/12/2020</a:t>
             </a:fld>
             <a:endParaRPr lang="pt-BR"/>
           </a:p>
@@ -2642,7 +2642,7 @@
           <a:p>
             <a:fld id="{26DF22C3-F9EA-40C4-AB4C-A1C88679FAB8}" type="slidenum">
               <a:rPr lang="pt-BR" smtClean="0"/>
-              <a:t>‹nº›</a:t>
+              <a:t>‹#›</a:t>
             </a:fld>
             <a:endParaRPr lang="pt-BR"/>
           </a:p>
@@ -7899,7 +7899,7 @@
         </p:nvGrpSpPr>
         <p:grpSpPr>
           <a:xfrm>
-            <a:off x="717473" y="6917953"/>
+            <a:off x="886970" y="1426775"/>
             <a:ext cx="3413969" cy="5440519"/>
             <a:chOff x="717473" y="6917953"/>
             <a:chExt cx="3413969" cy="5440519"/>
@@ -8383,7 +8383,7 @@
         </p:nvGrpSpPr>
         <p:grpSpPr>
           <a:xfrm>
-            <a:off x="4410398" y="6917946"/>
+            <a:off x="4645202" y="1431561"/>
             <a:ext cx="3371203" cy="5440519"/>
             <a:chOff x="4410398" y="6917946"/>
             <a:chExt cx="3371203" cy="5440519"/>
@@ -8453,7 +8453,7 @@
               <a:lstStyle/>
               <a:p>
                 <a:pPr algn="ctr"/>
-                <a:endParaRPr lang="pt-BR"/>
+                <a:endParaRPr lang="pt-BR" dirty="0"/>
               </a:p>
             </p:txBody>
           </p:sp>
@@ -8867,7 +8867,7 @@
         </p:nvGrpSpPr>
         <p:grpSpPr>
           <a:xfrm>
-            <a:off x="8100797" y="6917949"/>
+            <a:off x="8360667" y="1434492"/>
             <a:ext cx="3371203" cy="5440519"/>
             <a:chOff x="8100797" y="6917949"/>
             <a:chExt cx="3371203" cy="5440519"/>
@@ -39545,18 +39545,18 @@
 </file>
 
 <file path=customXml/item1.xml><?xml version="1.0" encoding="utf-8"?>
+<p:properties xmlns:p="http://schemas.microsoft.com/office/2006/metadata/properties" xmlns:xsi="http://www.w3.org/2001/XMLSchema-instance" xmlns:pc="http://schemas.microsoft.com/office/infopath/2007/PartnerControls">
+  <documentManagement/>
+</p:properties>
+</file>
+
+<file path=customXml/item2.xml><?xml version="1.0" encoding="utf-8"?>
 <?mso-contentType ?>
 <FormTemplates xmlns="http://schemas.microsoft.com/sharepoint/v3/contenttype/forms">
   <Display>DocumentLibraryForm</Display>
   <Edit>DocumentLibraryForm</Edit>
   <New>DocumentLibraryForm</New>
 </FormTemplates>
-</file>
-
-<file path=customXml/item2.xml><?xml version="1.0" encoding="utf-8"?>
-<p:properties xmlns:p="http://schemas.microsoft.com/office/2006/metadata/properties" xmlns:xsi="http://www.w3.org/2001/XMLSchema-instance" xmlns:pc="http://schemas.microsoft.com/office/infopath/2007/PartnerControls">
-  <documentManagement/>
-</p:properties>
 </file>
 
 <file path=customXml/item3.xml><?xml version="1.0" encoding="utf-8"?>
@@ -39757,26 +39757,26 @@
 </file>
 
 <file path=customXml/itemProps1.xml><?xml version="1.0" encoding="utf-8"?>
-<ds:datastoreItem xmlns:ds="http://schemas.openxmlformats.org/officeDocument/2006/customXml" ds:itemID="{E12B114C-EB44-46E6-930B-B69E30F6F9AE}">
+<ds:datastoreItem xmlns:ds="http://schemas.openxmlformats.org/officeDocument/2006/customXml" ds:itemID="{7972C250-C430-4380-B8BD-02E395B67AF0}">
   <ds:schemaRefs>
-    <ds:schemaRef ds:uri="http://schemas.microsoft.com/sharepoint/v3/contenttype/forms"/>
+    <ds:schemaRef ds:uri="http://purl.org/dc/terms/"/>
+    <ds:schemaRef ds:uri="http://schemas.openxmlformats.org/package/2006/metadata/core-properties"/>
+    <ds:schemaRef ds:uri="http://purl.org/dc/dcmitype/"/>
+    <ds:schemaRef ds:uri="http://schemas.microsoft.com/office/infopath/2007/PartnerControls"/>
+    <ds:schemaRef ds:uri="86822d51-02f5-488a-80f3-0b621e7c317a"/>
+    <ds:schemaRef ds:uri="http://purl.org/dc/elements/1.1/"/>
+    <ds:schemaRef ds:uri="http://schemas.microsoft.com/office/2006/metadata/properties"/>
+    <ds:schemaRef ds:uri="http://schemas.microsoft.com/office/2006/documentManagement/types"/>
+    <ds:schemaRef ds:uri="1f168f81-3f83-4b33-9f0c-ec152bce3f98"/>
+    <ds:schemaRef ds:uri="http://www.w3.org/XML/1998/namespace"/>
   </ds:schemaRefs>
 </ds:datastoreItem>
 </file>
 
 <file path=customXml/itemProps2.xml><?xml version="1.0" encoding="utf-8"?>
-<ds:datastoreItem xmlns:ds="http://schemas.openxmlformats.org/officeDocument/2006/customXml" ds:itemID="{7972C250-C430-4380-B8BD-02E395B67AF0}">
+<ds:datastoreItem xmlns:ds="http://schemas.openxmlformats.org/officeDocument/2006/customXml" ds:itemID="{E12B114C-EB44-46E6-930B-B69E30F6F9AE}">
   <ds:schemaRefs>
-    <ds:schemaRef ds:uri="http://purl.org/dc/dcmitype/"/>
-    <ds:schemaRef ds:uri="http://purl.org/dc/terms/"/>
-    <ds:schemaRef ds:uri="http://schemas.openxmlformats.org/package/2006/metadata/core-properties"/>
-    <ds:schemaRef ds:uri="http://schemas.microsoft.com/office/2006/documentManagement/types"/>
-    <ds:schemaRef ds:uri="http://www.w3.org/XML/1998/namespace"/>
-    <ds:schemaRef ds:uri="http://schemas.microsoft.com/office/infopath/2007/PartnerControls"/>
-    <ds:schemaRef ds:uri="http://purl.org/dc/elements/1.1/"/>
-    <ds:schemaRef ds:uri="86822d51-02f5-488a-80f3-0b621e7c317a"/>
-    <ds:schemaRef ds:uri="1f168f81-3f83-4b33-9f0c-ec152bce3f98"/>
-    <ds:schemaRef ds:uri="http://schemas.microsoft.com/office/2006/metadata/properties"/>
+    <ds:schemaRef ds:uri="http://schemas.microsoft.com/sharepoint/v3/contenttype/forms"/>
   </ds:schemaRefs>
 </ds:datastoreItem>
 </file>

</xml_diff>